<commit_message>
sup figure 3 added legend
</commit_message>
<xml_diff>
--- a/figure-assembly/sup-figure-3.pptx
+++ b/figure-assembly/sup-figure-3.pptx
@@ -243,7 +243,7 @@
           <a:p>
             <a:fld id="{25EC0CD3-564D-9742-98B5-86271438CCE6}" type="datetimeFigureOut">
               <a:rPr lang="en-US" smtClean="0"/>
-              <a:t>11/11/18</a:t>
+              <a:t>11/19/18</a:t>
             </a:fld>
             <a:endParaRPr lang="en-US"/>
           </a:p>
@@ -413,7 +413,7 @@
           <a:p>
             <a:fld id="{25EC0CD3-564D-9742-98B5-86271438CCE6}" type="datetimeFigureOut">
               <a:rPr lang="en-US" smtClean="0"/>
-              <a:t>11/11/18</a:t>
+              <a:t>11/19/18</a:t>
             </a:fld>
             <a:endParaRPr lang="en-US"/>
           </a:p>
@@ -593,7 +593,7 @@
           <a:p>
             <a:fld id="{25EC0CD3-564D-9742-98B5-86271438CCE6}" type="datetimeFigureOut">
               <a:rPr lang="en-US" smtClean="0"/>
-              <a:t>11/11/18</a:t>
+              <a:t>11/19/18</a:t>
             </a:fld>
             <a:endParaRPr lang="en-US"/>
           </a:p>
@@ -763,7 +763,7 @@
           <a:p>
             <a:fld id="{25EC0CD3-564D-9742-98B5-86271438CCE6}" type="datetimeFigureOut">
               <a:rPr lang="en-US" smtClean="0"/>
-              <a:t>11/11/18</a:t>
+              <a:t>11/19/18</a:t>
             </a:fld>
             <a:endParaRPr lang="en-US"/>
           </a:p>
@@ -1007,7 +1007,7 @@
           <a:p>
             <a:fld id="{25EC0CD3-564D-9742-98B5-86271438CCE6}" type="datetimeFigureOut">
               <a:rPr lang="en-US" smtClean="0"/>
-              <a:t>11/11/18</a:t>
+              <a:t>11/19/18</a:t>
             </a:fld>
             <a:endParaRPr lang="en-US"/>
           </a:p>
@@ -1239,7 +1239,7 @@
           <a:p>
             <a:fld id="{25EC0CD3-564D-9742-98B5-86271438CCE6}" type="datetimeFigureOut">
               <a:rPr lang="en-US" smtClean="0"/>
-              <a:t>11/11/18</a:t>
+              <a:t>11/19/18</a:t>
             </a:fld>
             <a:endParaRPr lang="en-US"/>
           </a:p>
@@ -1606,7 +1606,7 @@
           <a:p>
             <a:fld id="{25EC0CD3-564D-9742-98B5-86271438CCE6}" type="datetimeFigureOut">
               <a:rPr lang="en-US" smtClean="0"/>
-              <a:t>11/11/18</a:t>
+              <a:t>11/19/18</a:t>
             </a:fld>
             <a:endParaRPr lang="en-US"/>
           </a:p>
@@ -1724,7 +1724,7 @@
           <a:p>
             <a:fld id="{25EC0CD3-564D-9742-98B5-86271438CCE6}" type="datetimeFigureOut">
               <a:rPr lang="en-US" smtClean="0"/>
-              <a:t>11/11/18</a:t>
+              <a:t>11/19/18</a:t>
             </a:fld>
             <a:endParaRPr lang="en-US"/>
           </a:p>
@@ -1819,7 +1819,7 @@
           <a:p>
             <a:fld id="{25EC0CD3-564D-9742-98B5-86271438CCE6}" type="datetimeFigureOut">
               <a:rPr lang="en-US" smtClean="0"/>
-              <a:t>11/11/18</a:t>
+              <a:t>11/19/18</a:t>
             </a:fld>
             <a:endParaRPr lang="en-US"/>
           </a:p>
@@ -2096,7 +2096,7 @@
           <a:p>
             <a:fld id="{25EC0CD3-564D-9742-98B5-86271438CCE6}" type="datetimeFigureOut">
               <a:rPr lang="en-US" smtClean="0"/>
-              <a:t>11/11/18</a:t>
+              <a:t>11/19/18</a:t>
             </a:fld>
             <a:endParaRPr lang="en-US"/>
           </a:p>
@@ -2353,7 +2353,7 @@
           <a:p>
             <a:fld id="{25EC0CD3-564D-9742-98B5-86271438CCE6}" type="datetimeFigureOut">
               <a:rPr lang="en-US" smtClean="0"/>
-              <a:t>11/11/18</a:t>
+              <a:t>11/19/18</a:t>
             </a:fld>
             <a:endParaRPr lang="en-US"/>
           </a:p>
@@ -2566,7 +2566,7 @@
           <a:p>
             <a:fld id="{25EC0CD3-564D-9742-98B5-86271438CCE6}" type="datetimeFigureOut">
               <a:rPr lang="en-US" smtClean="0"/>
-              <a:t>11/11/18</a:t>
+              <a:t>11/19/18</a:t>
             </a:fld>
             <a:endParaRPr lang="en-US"/>
           </a:p>
@@ -3117,10 +3117,10 @@
       </p:sp>
       <p:pic>
         <p:nvPicPr>
-          <p:cNvPr id="4" name="Picture 3">
+          <p:cNvPr id="3" name="Picture 2">
             <a:extLst>
               <a:ext uri="{FF2B5EF4-FFF2-40B4-BE49-F238E27FC236}">
-                <a16:creationId xmlns:a16="http://schemas.microsoft.com/office/drawing/2014/main" id="{8D599270-39C6-CE45-A33A-382ED4AFF747}"/>
+                <a16:creationId xmlns:a16="http://schemas.microsoft.com/office/drawing/2014/main" id="{42828DC7-5859-674E-8377-C590985BCF77}"/>
               </a:ext>
             </a:extLst>
           </p:cNvPr>
@@ -3137,7 +3137,7 @@
         </p:blipFill>
         <p:spPr>
           <a:xfrm>
-            <a:off x="142505" y="1585762"/>
+            <a:off x="237505" y="1485481"/>
             <a:ext cx="9037122" cy="3081452"/>
           </a:xfrm>
           <a:prstGeom prst="rect">

</xml_diff>